<commit_message>
added specs to slides
</commit_message>
<xml_diff>
--- a/slides/OOP-SOLID-CodeMash.pptx
+++ b/slides/OOP-SOLID-CodeMash.pptx
@@ -5,7 +5,7 @@
     <p:sldMasterId id="2147483840" r:id="rId1"/>
   </p:sldMasterIdLst>
   <p:notesMasterIdLst>
-    <p:notesMasterId r:id="rId122"/>
+    <p:notesMasterId r:id="rId124"/>
   </p:notesMasterIdLst>
   <p:sldIdLst>
     <p:sldId id="256" r:id="rId2"/>
@@ -128,6 +128,8 @@
     <p:sldId id="340" r:id="rId119"/>
     <p:sldId id="332" r:id="rId120"/>
     <p:sldId id="333" r:id="rId121"/>
+    <p:sldId id="412" r:id="rId122"/>
+    <p:sldId id="413" r:id="rId123"/>
   </p:sldIdLst>
   <p:sldSz cx="9144000" cy="6858000" type="screen4x3"/>
   <p:notesSz cx="6858000" cy="9144000"/>
@@ -312,7 +314,7 @@
             <a:fld id="{CE22DD2D-CE48-432A-B750-FE638311F72D}" type="datetimeFigureOut">
               <a:rPr lang="en-US" smtClean="0"/>
               <a:pPr/>
-              <a:t>1/10/2010</a:t>
+              <a:t>1/11/2010</a:t>
             </a:fld>
             <a:endParaRPr lang="en-US"/>
           </a:p>
@@ -2623,11 +2625,7 @@
             </a:pPr>
             <a:r>
               <a:rPr lang="en-US" baseline="0" dirty="0" smtClean="0"/>
-              <a:t>http</a:t>
-            </a:r>
-            <a:r>
-              <a:rPr lang="en-US" baseline="0" dirty="0" smtClean="0"/>
-              <a:t>://www.codinghorror.com/blog/archives/000801.html</a:t>
+              <a:t>http://www.codinghorror.com/blog/archives/000801.html</a:t>
             </a:r>
             <a:endParaRPr lang="en-US" dirty="0"/>
           </a:p>
@@ -5944,7 +5942,7 @@
             <a:fld id="{C3F416CD-67A3-4CF0-A210-F6AF31AC147F}" type="datetimeFigureOut">
               <a:rPr lang="en-US" smtClean="0"/>
               <a:pPr/>
-              <a:t>1/10/2010</a:t>
+              <a:t>1/11/2010</a:t>
             </a:fld>
             <a:endParaRPr lang="en-US"/>
           </a:p>
@@ -6124,7 +6122,7 @@
             <a:fld id="{C3F416CD-67A3-4CF0-A210-F6AF31AC147F}" type="datetimeFigureOut">
               <a:rPr lang="en-US" smtClean="0"/>
               <a:pPr/>
-              <a:t>1/10/2010</a:t>
+              <a:t>1/11/2010</a:t>
             </a:fld>
             <a:endParaRPr lang="en-US"/>
           </a:p>
@@ -6301,7 +6299,7 @@
             <a:fld id="{C3F416CD-67A3-4CF0-A210-F6AF31AC147F}" type="datetimeFigureOut">
               <a:rPr lang="en-US" smtClean="0"/>
               <a:pPr/>
-              <a:t>1/10/2010</a:t>
+              <a:t>1/11/2010</a:t>
             </a:fld>
             <a:endParaRPr lang="en-US"/>
           </a:p>
@@ -6468,7 +6466,7 @@
             <a:fld id="{C3F416CD-67A3-4CF0-A210-F6AF31AC147F}" type="datetimeFigureOut">
               <a:rPr lang="en-US" smtClean="0"/>
               <a:pPr/>
-              <a:t>1/10/2010</a:t>
+              <a:t>1/11/2010</a:t>
             </a:fld>
             <a:endParaRPr lang="en-US"/>
           </a:p>
@@ -6681,7 +6679,7 @@
             <a:fld id="{C3F416CD-67A3-4CF0-A210-F6AF31AC147F}" type="datetimeFigureOut">
               <a:rPr lang="en-US" smtClean="0"/>
               <a:pPr/>
-              <a:t>1/10/2010</a:t>
+              <a:t>1/11/2010</a:t>
             </a:fld>
             <a:endParaRPr lang="en-US"/>
           </a:p>
@@ -6966,7 +6964,7 @@
             <a:fld id="{C3F416CD-67A3-4CF0-A210-F6AF31AC147F}" type="datetimeFigureOut">
               <a:rPr lang="en-US" smtClean="0"/>
               <a:pPr/>
-              <a:t>1/10/2010</a:t>
+              <a:t>1/11/2010</a:t>
             </a:fld>
             <a:endParaRPr lang="en-US"/>
           </a:p>
@@ -7398,7 +7396,7 @@
             <a:fld id="{C3F416CD-67A3-4CF0-A210-F6AF31AC147F}" type="datetimeFigureOut">
               <a:rPr lang="en-US" smtClean="0"/>
               <a:pPr algn="l" eaLnBrk="1" latinLnBrk="0" hangingPunct="1"/>
-              <a:t>1/10/2010</a:t>
+              <a:t>1/11/2010</a:t>
             </a:fld>
             <a:endParaRPr lang="en-US"/>
           </a:p>
@@ -7518,7 +7516,7 @@
             <a:fld id="{C3F416CD-67A3-4CF0-A210-F6AF31AC147F}" type="datetimeFigureOut">
               <a:rPr lang="en-US" smtClean="0"/>
               <a:pPr/>
-              <a:t>1/10/2010</a:t>
+              <a:t>1/11/2010</a:t>
             </a:fld>
             <a:endParaRPr lang="en-US"/>
           </a:p>
@@ -7610,7 +7608,7 @@
             <a:fld id="{C3F416CD-67A3-4CF0-A210-F6AF31AC147F}" type="datetimeFigureOut">
               <a:rPr lang="en-US" smtClean="0"/>
               <a:pPr/>
-              <a:t>1/10/2010</a:t>
+              <a:t>1/11/2010</a:t>
             </a:fld>
             <a:endParaRPr lang="en-US"/>
           </a:p>
@@ -7901,7 +7899,7 @@
             <a:fld id="{C3F416CD-67A3-4CF0-A210-F6AF31AC147F}" type="datetimeFigureOut">
               <a:rPr lang="en-US" smtClean="0"/>
               <a:pPr/>
-              <a:t>1/10/2010</a:t>
+              <a:t>1/11/2010</a:t>
             </a:fld>
             <a:endParaRPr lang="en-US"/>
           </a:p>
@@ -8228,7 +8226,7 @@
             <a:fld id="{C3F416CD-67A3-4CF0-A210-F6AF31AC147F}" type="datetimeFigureOut">
               <a:rPr lang="en-US" smtClean="0"/>
               <a:pPr/>
-              <a:t>1/10/2010</a:t>
+              <a:t>1/11/2010</a:t>
             </a:fld>
             <a:endParaRPr lang="en-US"/>
           </a:p>
@@ -8449,7 +8447,7 @@
             <a:fld id="{C3F416CD-67A3-4CF0-A210-F6AF31AC147F}" type="datetimeFigureOut">
               <a:rPr lang="en-US" smtClean="0"/>
               <a:pPr algn="l" eaLnBrk="1" latinLnBrk="0" hangingPunct="1"/>
-              <a:t>1/10/2010</a:t>
+              <a:t>1/11/2010</a:t>
             </a:fld>
             <a:endParaRPr lang="en-US" sz="800" dirty="0">
               <a:solidFill>
@@ -15414,6 +15412,688 @@
 </p:sld>
 </file>
 
+<file path=ppt/slides/slide121.xml><?xml version="1.0" encoding="utf-8"?>
+<p:sld xmlns:a="http://schemas.openxmlformats.org/drawingml/2006/main" xmlns:r="http://schemas.openxmlformats.org/officeDocument/2006/relationships" xmlns:p="http://schemas.openxmlformats.org/presentationml/2006/main">
+  <p:cSld>
+    <p:spTree>
+      <p:nvGrpSpPr>
+        <p:cNvPr id="1" name=""/>
+        <p:cNvGrpSpPr/>
+        <p:nvPr/>
+      </p:nvGrpSpPr>
+      <p:grpSpPr>
+        <a:xfrm>
+          <a:off x="0" y="0"/>
+          <a:ext cx="0" cy="0"/>
+          <a:chOff x="0" y="0"/>
+          <a:chExt cx="0" cy="0"/>
+        </a:xfrm>
+      </p:grpSpPr>
+      <p:sp>
+        <p:nvSpPr>
+          <p:cNvPr id="4" name="TextBox 3"/>
+          <p:cNvSpPr txBox="1"/>
+          <p:nvPr/>
+        </p:nvSpPr>
+        <p:spPr>
+          <a:xfrm>
+            <a:off x="0" y="0"/>
+            <a:ext cx="9144000" cy="6924973"/>
+          </a:xfrm>
+          <a:prstGeom prst="rect">
+            <a:avLst/>
+          </a:prstGeom>
+          <a:noFill/>
+        </p:spPr>
+        <p:txBody>
+          <a:bodyPr wrap="square" rtlCol="0">
+            <a:spAutoFit/>
+          </a:bodyPr>
+          <a:lstStyle/>
+          <a:p>
+            <a:r>
+              <a:rPr lang="en-US" sz="1200" b="1" i="1" u="sng" dirty="0" smtClean="0"/>
+              <a:t>"Draw Five"</a:t>
+            </a:r>
+            <a:endParaRPr lang="en-US" sz="1200" dirty="0" smtClean="0"/>
+          </a:p>
+          <a:p>
+            <a:r>
+              <a:rPr lang="en-US" sz="1200" dirty="0" smtClean="0"/>
+              <a:t>Draw Five is a card game where you draw five cards and get points based on the cards that you draw.  You can also view the high scores and save high scores to a database</a:t>
+            </a:r>
+            <a:r>
+              <a:rPr lang="en-US" sz="1200" dirty="0" smtClean="0"/>
+              <a:t>.</a:t>
+            </a:r>
+          </a:p>
+          <a:p>
+            <a:endParaRPr lang="en-US" sz="1200" dirty="0" smtClean="0"/>
+          </a:p>
+          <a:p>
+            <a:r>
+              <a:rPr lang="en-US" sz="1200" dirty="0" smtClean="0"/>
+              <a:t>When drawing cards</a:t>
+            </a:r>
+            <a:br>
+              <a:rPr lang="en-US" sz="1200" dirty="0" smtClean="0"/>
+            </a:br>
+            <a:r>
+              <a:rPr lang="en-US" sz="1200" dirty="0" smtClean="0"/>
+              <a:t>- 5 cards are drawn from a standard 52-card deck (keep in mind that the same card cannot be drawn twice)</a:t>
+            </a:r>
+            <a:br>
+              <a:rPr lang="en-US" sz="1200" dirty="0" smtClean="0"/>
+            </a:br>
+            <a:r>
+              <a:rPr lang="en-US" sz="1200" dirty="0" smtClean="0"/>
+              <a:t>- should show the user what cards they drew</a:t>
+            </a:r>
+          </a:p>
+          <a:p>
+            <a:endParaRPr lang="en-US" sz="1200" dirty="0" smtClean="0"/>
+          </a:p>
+          <a:p>
+            <a:r>
+              <a:rPr lang="en-US" sz="1200" dirty="0" smtClean="0"/>
+              <a:t>When </a:t>
+            </a:r>
+            <a:r>
+              <a:rPr lang="en-US" sz="1200" dirty="0" smtClean="0"/>
+              <a:t>scoring the draw</a:t>
+            </a:r>
+            <a:br>
+              <a:rPr lang="en-US" sz="1200" dirty="0" smtClean="0"/>
+            </a:br>
+            <a:r>
+              <a:rPr lang="en-US" sz="1200" dirty="0" smtClean="0"/>
+              <a:t>- face cards = 10</a:t>
+            </a:r>
+            <a:br>
+              <a:rPr lang="en-US" sz="1200" dirty="0" smtClean="0"/>
+            </a:br>
+            <a:r>
+              <a:rPr lang="en-US" sz="1200" dirty="0" smtClean="0"/>
+              <a:t>- aces = 15</a:t>
+            </a:r>
+            <a:br>
+              <a:rPr lang="en-US" sz="1200" dirty="0" smtClean="0"/>
+            </a:br>
+            <a:r>
+              <a:rPr lang="en-US" sz="1200" dirty="0" smtClean="0"/>
+              <a:t>- numbers = number value</a:t>
+            </a:r>
+          </a:p>
+          <a:p>
+            <a:endParaRPr lang="en-US" sz="1200" dirty="0" smtClean="0"/>
+          </a:p>
+          <a:p>
+            <a:r>
+              <a:rPr lang="en-US" sz="1200" dirty="0" smtClean="0"/>
+              <a:t>in </a:t>
+            </a:r>
+            <a:r>
+              <a:rPr lang="en-US" sz="1200" dirty="0" smtClean="0"/>
+              <a:t>addition to base score:</a:t>
+            </a:r>
+            <a:br>
+              <a:rPr lang="en-US" sz="1200" dirty="0" smtClean="0"/>
+            </a:br>
+            <a:r>
+              <a:rPr lang="en-US" sz="1200" dirty="0" smtClean="0"/>
+              <a:t>- each pair +50</a:t>
+            </a:r>
+            <a:br>
+              <a:rPr lang="en-US" sz="1200" dirty="0" smtClean="0"/>
+            </a:br>
+            <a:r>
+              <a:rPr lang="en-US" sz="1200" dirty="0" smtClean="0"/>
+              <a:t>- three of a kind +150</a:t>
+            </a:r>
+            <a:br>
+              <a:rPr lang="en-US" sz="1200" dirty="0" smtClean="0"/>
+            </a:br>
+            <a:r>
+              <a:rPr lang="en-US" sz="1200" dirty="0" smtClean="0"/>
+              <a:t>- four of a kind +300</a:t>
+            </a:r>
+            <a:br>
+              <a:rPr lang="en-US" sz="1200" dirty="0" smtClean="0"/>
+            </a:br>
+            <a:r>
+              <a:rPr lang="en-US" sz="1200" dirty="0" smtClean="0"/>
+              <a:t>- each spade +</a:t>
+            </a:r>
+            <a:r>
+              <a:rPr lang="en-US" sz="1200" dirty="0" smtClean="0"/>
+              <a:t>1</a:t>
+            </a:r>
+          </a:p>
+          <a:p>
+            <a:endParaRPr lang="en-US" sz="1200" dirty="0" smtClean="0"/>
+          </a:p>
+          <a:p>
+            <a:r>
+              <a:rPr lang="en-US" sz="1200" dirty="0" smtClean="0"/>
+              <a:t>When showing the high scores</a:t>
+            </a:r>
+            <a:br>
+              <a:rPr lang="en-US" sz="1200" dirty="0" smtClean="0"/>
+            </a:br>
+            <a:r>
+              <a:rPr lang="en-US" sz="1200" dirty="0" smtClean="0"/>
+              <a:t>- should show the top 5 scores (name and score)</a:t>
+            </a:r>
+          </a:p>
+          <a:p>
+            <a:endParaRPr lang="en-US" sz="1200" dirty="0" smtClean="0"/>
+          </a:p>
+          <a:p>
+            <a:r>
+              <a:rPr lang="en-US" sz="1200" dirty="0" smtClean="0"/>
+              <a:t>When </a:t>
+            </a:r>
+            <a:r>
+              <a:rPr lang="en-US" sz="1200" dirty="0" smtClean="0"/>
+              <a:t>saving a high score</a:t>
+            </a:r>
+            <a:br>
+              <a:rPr lang="en-US" sz="1200" dirty="0" smtClean="0"/>
+            </a:br>
+            <a:r>
+              <a:rPr lang="en-US" sz="1200" dirty="0" smtClean="0"/>
+              <a:t>- should save the name (entered by the user) and the score</a:t>
+            </a:r>
+          </a:p>
+          <a:p>
+            <a:r>
+              <a:rPr lang="en-US" sz="1200" dirty="0" smtClean="0"/>
+              <a:t>===========================================================================</a:t>
+            </a:r>
+          </a:p>
+          <a:p>
+            <a:r>
+              <a:rPr lang="en-US" sz="1200" b="1" i="1" u="sng" dirty="0" smtClean="0"/>
+              <a:t>"Blackjack"</a:t>
+            </a:r>
+            <a:endParaRPr lang="en-US" sz="1200" dirty="0" smtClean="0"/>
+          </a:p>
+          <a:p>
+            <a:r>
+              <a:rPr lang="en-US" sz="1200" dirty="0" smtClean="0"/>
+              <a:t>In this simple version of blackjack, you just draw two cards and calculate the score for the two cards (no drawing of extra cards).  High scores are not saved in Blackjack</a:t>
+            </a:r>
+            <a:r>
+              <a:rPr lang="en-US" sz="1200" dirty="0" smtClean="0"/>
+              <a:t>.</a:t>
+            </a:r>
+          </a:p>
+          <a:p>
+            <a:endParaRPr lang="en-US" sz="1200" dirty="0" smtClean="0"/>
+          </a:p>
+          <a:p>
+            <a:r>
+              <a:rPr lang="en-US" sz="1200" dirty="0" smtClean="0"/>
+              <a:t>When drawing cards</a:t>
+            </a:r>
+            <a:br>
+              <a:rPr lang="en-US" sz="1200" dirty="0" smtClean="0"/>
+            </a:br>
+            <a:r>
+              <a:rPr lang="en-US" sz="1200" dirty="0" smtClean="0"/>
+              <a:t>- 5 cards are drawn from a standard 52-card deck (keep in mind that the same card cannot be drawn twice)</a:t>
+            </a:r>
+            <a:br>
+              <a:rPr lang="en-US" sz="1200" dirty="0" smtClean="0"/>
+            </a:br>
+            <a:r>
+              <a:rPr lang="en-US" sz="1200" dirty="0" smtClean="0"/>
+              <a:t>- should show the user what cards they drew</a:t>
+            </a:r>
+          </a:p>
+          <a:p>
+            <a:endParaRPr lang="en-US" sz="1200" dirty="0" smtClean="0"/>
+          </a:p>
+          <a:p>
+            <a:r>
+              <a:rPr lang="en-US" sz="1200" dirty="0" smtClean="0"/>
+              <a:t>When </a:t>
+            </a:r>
+            <a:r>
+              <a:rPr lang="en-US" sz="1200" dirty="0" smtClean="0"/>
+              <a:t>scoring the draw</a:t>
+            </a:r>
+            <a:br>
+              <a:rPr lang="en-US" sz="1200" dirty="0" smtClean="0"/>
+            </a:br>
+            <a:r>
+              <a:rPr lang="en-US" sz="1200" dirty="0" smtClean="0"/>
+              <a:t>- face cards = 10</a:t>
+            </a:r>
+            <a:br>
+              <a:rPr lang="en-US" sz="1200" dirty="0" smtClean="0"/>
+            </a:br>
+            <a:r>
+              <a:rPr lang="en-US" sz="1200" dirty="0" smtClean="0"/>
+              <a:t>- aces = 11</a:t>
+            </a:r>
+            <a:br>
+              <a:rPr lang="en-US" sz="1200" dirty="0" smtClean="0"/>
+            </a:br>
+            <a:r>
+              <a:rPr lang="en-US" sz="1200" dirty="0" smtClean="0"/>
+              <a:t>- numbers = number </a:t>
+            </a:r>
+            <a:r>
+              <a:rPr lang="en-US" sz="1200" dirty="0" smtClean="0"/>
+              <a:t>value</a:t>
+            </a:r>
+            <a:endParaRPr lang="en-US" sz="1200" dirty="0"/>
+          </a:p>
+        </p:txBody>
+      </p:sp>
+    </p:spTree>
+  </p:cSld>
+  <p:clrMapOvr>
+    <a:masterClrMapping/>
+  </p:clrMapOvr>
+  <p:timing>
+    <p:tnLst>
+      <p:par>
+        <p:cTn id="1" dur="indefinite" restart="never" nodeType="tmRoot"/>
+      </p:par>
+    </p:tnLst>
+  </p:timing>
+</p:sld>
+</file>
+
+<file path=ppt/slides/slide122.xml><?xml version="1.0" encoding="utf-8"?>
+<p:sld xmlns:a="http://schemas.openxmlformats.org/drawingml/2006/main" xmlns:r="http://schemas.openxmlformats.org/officeDocument/2006/relationships" xmlns:p="http://schemas.openxmlformats.org/presentationml/2006/main">
+  <p:cSld>
+    <p:spTree>
+      <p:nvGrpSpPr>
+        <p:cNvPr id="1" name=""/>
+        <p:cNvGrpSpPr/>
+        <p:nvPr/>
+      </p:nvGrpSpPr>
+      <p:grpSpPr>
+        <a:xfrm>
+          <a:off x="0" y="0"/>
+          <a:ext cx="0" cy="0"/>
+          <a:chOff x="0" y="0"/>
+          <a:chExt cx="0" cy="0"/>
+        </a:xfrm>
+      </p:grpSpPr>
+      <p:sp>
+        <p:nvSpPr>
+          <p:cNvPr id="4" name="TextBox 3"/>
+          <p:cNvSpPr txBox="1"/>
+          <p:nvPr/>
+        </p:nvSpPr>
+        <p:spPr>
+          <a:xfrm>
+            <a:off x="152400" y="228600"/>
+            <a:ext cx="8915400" cy="1569660"/>
+          </a:xfrm>
+          <a:prstGeom prst="rect">
+            <a:avLst/>
+          </a:prstGeom>
+          <a:noFill/>
+        </p:spPr>
+        <p:txBody>
+          <a:bodyPr wrap="square" rtlCol="0">
+            <a:spAutoFit/>
+          </a:bodyPr>
+          <a:lstStyle/>
+          <a:p>
+            <a:r>
+              <a:rPr lang="en-US" sz="2400" b="1" i="1" u="sng" dirty="0" smtClean="0"/>
+              <a:t>change #1</a:t>
+            </a:r>
+          </a:p>
+          <a:p>
+            <a:r>
+              <a:rPr lang="en-US" sz="2400" dirty="0" smtClean="0"/>
+              <a:t>- Draw Five has 2 Jokers in the deck</a:t>
+            </a:r>
+          </a:p>
+          <a:p>
+            <a:r>
+              <a:rPr lang="en-US" sz="2400" dirty="0" smtClean="0"/>
+              <a:t>- jokers = 20 pts each</a:t>
+            </a:r>
+          </a:p>
+          <a:p>
+            <a:r>
+              <a:rPr lang="en-US" sz="2400" dirty="0" smtClean="0"/>
+              <a:t>- two jokers = 200 pt bonus (in addition to the 20 pts for each Joker)</a:t>
+            </a:r>
+          </a:p>
+        </p:txBody>
+      </p:sp>
+      <p:sp>
+        <p:nvSpPr>
+          <p:cNvPr id="3" name="TextBox 2"/>
+          <p:cNvSpPr txBox="1"/>
+          <p:nvPr/>
+        </p:nvSpPr>
+        <p:spPr>
+          <a:xfrm>
+            <a:off x="152400" y="1835527"/>
+            <a:ext cx="8915400" cy="2677656"/>
+          </a:xfrm>
+          <a:prstGeom prst="rect">
+            <a:avLst/>
+          </a:prstGeom>
+          <a:noFill/>
+        </p:spPr>
+        <p:txBody>
+          <a:bodyPr wrap="square" rtlCol="0">
+            <a:spAutoFit/>
+          </a:bodyPr>
+          <a:lstStyle/>
+          <a:p>
+            <a:r>
+              <a:rPr lang="en-US" sz="2400" b="1" i="1" u="sng" dirty="0" smtClean="0"/>
+              <a:t>change #2</a:t>
+            </a:r>
+          </a:p>
+          <a:p>
+            <a:r>
+              <a:rPr lang="en-US" sz="2400" dirty="0" smtClean="0"/>
+              <a:t>- in Draw Five:</a:t>
+            </a:r>
+          </a:p>
+          <a:p>
+            <a:r>
+              <a:rPr lang="en-US" sz="2400" dirty="0" smtClean="0"/>
+              <a:t>   - a "run" of 3 sequential cards is worth 50 pts</a:t>
+            </a:r>
+          </a:p>
+          <a:p>
+            <a:r>
+              <a:rPr lang="en-US" sz="2400" dirty="0" smtClean="0"/>
+              <a:t>   - a "run" of 4 sequential cards is worth 100 pts</a:t>
+            </a:r>
+          </a:p>
+          <a:p>
+            <a:r>
+              <a:rPr lang="en-US" sz="2400" dirty="0" smtClean="0"/>
+              <a:t>   - a "run" of 5 sequential cards is worth 150 pts</a:t>
+            </a:r>
+          </a:p>
+          <a:p>
+            <a:r>
+              <a:rPr lang="en-US" sz="2400" dirty="0" smtClean="0"/>
+              <a:t>   - the order of cards for "runs" is: A,2,3,4,5,6,7,8,9,10,J,Q,K,A (notice the Ace can be used at either end)</a:t>
+            </a:r>
+          </a:p>
+        </p:txBody>
+      </p:sp>
+      <p:sp>
+        <p:nvSpPr>
+          <p:cNvPr id="5" name="TextBox 4"/>
+          <p:cNvSpPr txBox="1"/>
+          <p:nvPr/>
+        </p:nvSpPr>
+        <p:spPr>
+          <a:xfrm>
+            <a:off x="228600" y="4590871"/>
+            <a:ext cx="8915400" cy="1200329"/>
+          </a:xfrm>
+          <a:prstGeom prst="rect">
+            <a:avLst/>
+          </a:prstGeom>
+          <a:noFill/>
+        </p:spPr>
+        <p:txBody>
+          <a:bodyPr wrap="square" rtlCol="0">
+            <a:spAutoFit/>
+          </a:bodyPr>
+          <a:lstStyle/>
+          <a:p>
+            <a:r>
+              <a:rPr lang="en-US" sz="2400" b="1" i="1" u="sng" dirty="0" smtClean="0"/>
+              <a:t>extra credit change</a:t>
+            </a:r>
+          </a:p>
+          <a:p>
+            <a:r>
+              <a:rPr lang="en-US" sz="2400" dirty="0" smtClean="0"/>
+              <a:t>- create an interface that will allow people to write their own scoring system as a </a:t>
+            </a:r>
+            <a:r>
+              <a:rPr lang="en-US" sz="2400" dirty="0" err="1" smtClean="0"/>
+              <a:t>plugin</a:t>
+            </a:r>
+            <a:endParaRPr lang="en-US" sz="2400" dirty="0" smtClean="0"/>
+          </a:p>
+        </p:txBody>
+      </p:sp>
+    </p:spTree>
+  </p:cSld>
+  <p:clrMapOvr>
+    <a:masterClrMapping/>
+  </p:clrMapOvr>
+  <p:timing>
+    <p:tnLst>
+      <p:par>
+        <p:cTn id="1" dur="indefinite" restart="never" nodeType="tmRoot">
+          <p:childTnLst>
+            <p:seq concurrent="1" nextAc="seek">
+              <p:cTn id="2" dur="indefinite" nodeType="mainSeq">
+                <p:childTnLst>
+                  <p:par>
+                    <p:cTn id="3" fill="hold">
+                      <p:stCondLst>
+                        <p:cond delay="indefinite"/>
+                      </p:stCondLst>
+                      <p:childTnLst>
+                        <p:par>
+                          <p:cTn id="4" fill="hold">
+                            <p:stCondLst>
+                              <p:cond delay="0"/>
+                            </p:stCondLst>
+                            <p:childTnLst>
+                              <p:par>
+                                <p:cTn id="5" presetID="2" presetClass="entr" presetSubtype="4" fill="hold" grpId="0" nodeType="clickEffect">
+                                  <p:stCondLst>
+                                    <p:cond delay="0"/>
+                                  </p:stCondLst>
+                                  <p:childTnLst>
+                                    <p:set>
+                                      <p:cBhvr>
+                                        <p:cTn id="6" dur="1" fill="hold">
+                                          <p:stCondLst>
+                                            <p:cond delay="0"/>
+                                          </p:stCondLst>
+                                        </p:cTn>
+                                        <p:tgtEl>
+                                          <p:spTgt spid="3"/>
+                                        </p:tgtEl>
+                                        <p:attrNameLst>
+                                          <p:attrName>style.visibility</p:attrName>
+                                        </p:attrNameLst>
+                                      </p:cBhvr>
+                                      <p:to>
+                                        <p:strVal val="visible"/>
+                                      </p:to>
+                                    </p:set>
+                                    <p:anim calcmode="lin" valueType="num">
+                                      <p:cBhvr additive="base">
+                                        <p:cTn id="7" dur="500" fill="hold"/>
+                                        <p:tgtEl>
+                                          <p:spTgt spid="3"/>
+                                        </p:tgtEl>
+                                        <p:attrNameLst>
+                                          <p:attrName>ppt_x</p:attrName>
+                                        </p:attrNameLst>
+                                      </p:cBhvr>
+                                      <p:tavLst>
+                                        <p:tav tm="0">
+                                          <p:val>
+                                            <p:strVal val="#ppt_x"/>
+                                          </p:val>
+                                        </p:tav>
+                                        <p:tav tm="100000">
+                                          <p:val>
+                                            <p:strVal val="#ppt_x"/>
+                                          </p:val>
+                                        </p:tav>
+                                      </p:tavLst>
+                                    </p:anim>
+                                    <p:anim calcmode="lin" valueType="num">
+                                      <p:cBhvr additive="base">
+                                        <p:cTn id="8" dur="500" fill="hold"/>
+                                        <p:tgtEl>
+                                          <p:spTgt spid="3"/>
+                                        </p:tgtEl>
+                                        <p:attrNameLst>
+                                          <p:attrName>ppt_y</p:attrName>
+                                        </p:attrNameLst>
+                                      </p:cBhvr>
+                                      <p:tavLst>
+                                        <p:tav tm="0">
+                                          <p:val>
+                                            <p:strVal val="1+#ppt_h/2"/>
+                                          </p:val>
+                                        </p:tav>
+                                        <p:tav tm="100000">
+                                          <p:val>
+                                            <p:strVal val="#ppt_y"/>
+                                          </p:val>
+                                        </p:tav>
+                                      </p:tavLst>
+                                    </p:anim>
+                                  </p:childTnLst>
+                                </p:cTn>
+                              </p:par>
+                            </p:childTnLst>
+                          </p:cTn>
+                        </p:par>
+                      </p:childTnLst>
+                    </p:cTn>
+                  </p:par>
+                  <p:par>
+                    <p:cTn id="9" fill="hold">
+                      <p:stCondLst>
+                        <p:cond delay="indefinite"/>
+                      </p:stCondLst>
+                      <p:childTnLst>
+                        <p:par>
+                          <p:cTn id="10" fill="hold">
+                            <p:stCondLst>
+                              <p:cond delay="0"/>
+                            </p:stCondLst>
+                            <p:childTnLst>
+                              <p:par>
+                                <p:cTn id="11" presetID="2" presetClass="entr" presetSubtype="4" fill="hold" grpId="0" nodeType="clickEffect">
+                                  <p:stCondLst>
+                                    <p:cond delay="0"/>
+                                  </p:stCondLst>
+                                  <p:childTnLst>
+                                    <p:set>
+                                      <p:cBhvr>
+                                        <p:cTn id="12" dur="1" fill="hold">
+                                          <p:stCondLst>
+                                            <p:cond delay="0"/>
+                                          </p:stCondLst>
+                                        </p:cTn>
+                                        <p:tgtEl>
+                                          <p:spTgt spid="5"/>
+                                        </p:tgtEl>
+                                        <p:attrNameLst>
+                                          <p:attrName>style.visibility</p:attrName>
+                                        </p:attrNameLst>
+                                      </p:cBhvr>
+                                      <p:to>
+                                        <p:strVal val="visible"/>
+                                      </p:to>
+                                    </p:set>
+                                    <p:anim calcmode="lin" valueType="num">
+                                      <p:cBhvr additive="base">
+                                        <p:cTn id="13" dur="500" fill="hold"/>
+                                        <p:tgtEl>
+                                          <p:spTgt spid="5"/>
+                                        </p:tgtEl>
+                                        <p:attrNameLst>
+                                          <p:attrName>ppt_x</p:attrName>
+                                        </p:attrNameLst>
+                                      </p:cBhvr>
+                                      <p:tavLst>
+                                        <p:tav tm="0">
+                                          <p:val>
+                                            <p:strVal val="#ppt_x"/>
+                                          </p:val>
+                                        </p:tav>
+                                        <p:tav tm="100000">
+                                          <p:val>
+                                            <p:strVal val="#ppt_x"/>
+                                          </p:val>
+                                        </p:tav>
+                                      </p:tavLst>
+                                    </p:anim>
+                                    <p:anim calcmode="lin" valueType="num">
+                                      <p:cBhvr additive="base">
+                                        <p:cTn id="14" dur="500" fill="hold"/>
+                                        <p:tgtEl>
+                                          <p:spTgt spid="5"/>
+                                        </p:tgtEl>
+                                        <p:attrNameLst>
+                                          <p:attrName>ppt_y</p:attrName>
+                                        </p:attrNameLst>
+                                      </p:cBhvr>
+                                      <p:tavLst>
+                                        <p:tav tm="0">
+                                          <p:val>
+                                            <p:strVal val="1+#ppt_h/2"/>
+                                          </p:val>
+                                        </p:tav>
+                                        <p:tav tm="100000">
+                                          <p:val>
+                                            <p:strVal val="#ppt_y"/>
+                                          </p:val>
+                                        </p:tav>
+                                      </p:tavLst>
+                                    </p:anim>
+                                  </p:childTnLst>
+                                </p:cTn>
+                              </p:par>
+                            </p:childTnLst>
+                          </p:cTn>
+                        </p:par>
+                      </p:childTnLst>
+                    </p:cTn>
+                  </p:par>
+                </p:childTnLst>
+              </p:cTn>
+              <p:prevCondLst>
+                <p:cond evt="onPrev" delay="0">
+                  <p:tgtEl>
+                    <p:sldTgt/>
+                  </p:tgtEl>
+                </p:cond>
+              </p:prevCondLst>
+              <p:nextCondLst>
+                <p:cond evt="onNext" delay="0">
+                  <p:tgtEl>
+                    <p:sldTgt/>
+                  </p:tgtEl>
+                </p:cond>
+              </p:nextCondLst>
+            </p:seq>
+          </p:childTnLst>
+        </p:cTn>
+      </p:par>
+    </p:tnLst>
+    <p:bldLst>
+      <p:bldP spid="3" grpId="0"/>
+      <p:bldP spid="5" grpId="0"/>
+    </p:bldLst>
+  </p:timing>
+</p:sld>
+</file>
+
 <file path=ppt/slides/slide13.xml><?xml version="1.0" encoding="utf-8"?>
 <p:sld xmlns:a="http://schemas.openxmlformats.org/drawingml/2006/main" xmlns:r="http://schemas.openxmlformats.org/officeDocument/2006/relationships" xmlns:p="http://schemas.openxmlformats.org/presentationml/2006/main">
   <p:cSld>
@@ -21530,10 +22210,6 @@
               </a:rPr>
               <a:t>{</a:t>
             </a:r>
-            <a:endParaRPr lang="en-US" sz="1300" b="1" dirty="0" smtClean="0">
-              <a:latin typeface="Courier New" pitchFamily="49" charset="0"/>
-              <a:cs typeface="Courier New" pitchFamily="49" charset="0"/>
-            </a:endParaRPr>
           </a:p>
           <a:p>
             <a:pPr>
@@ -21544,34 +22220,124 @@
                 <a:latin typeface="Courier New" pitchFamily="49" charset="0"/>
                 <a:cs typeface="Courier New" pitchFamily="49" charset="0"/>
               </a:rPr>
+              <a:t>    public void </a:t>
+            </a:r>
+            <a:r>
+              <a:rPr lang="en-US" sz="1300" b="1" dirty="0" err="1" smtClean="0">
+                <a:latin typeface="Courier New" pitchFamily="49" charset="0"/>
+                <a:cs typeface="Courier New" pitchFamily="49" charset="0"/>
+              </a:rPr>
+              <a:t>DoSomething</a:t>
+            </a:r>
+            <a:r>
+              <a:rPr lang="en-US" sz="1300" b="1" dirty="0" smtClean="0">
+                <a:latin typeface="Courier New" pitchFamily="49" charset="0"/>
+                <a:cs typeface="Courier New" pitchFamily="49" charset="0"/>
+              </a:rPr>
+              <a:t>(</a:t>
+            </a:r>
+            <a:r>
+              <a:rPr lang="en-US" sz="1300" b="1" dirty="0" err="1" smtClean="0">
+                <a:latin typeface="Courier New" pitchFamily="49" charset="0"/>
+                <a:cs typeface="Courier New" pitchFamily="49" charset="0"/>
+              </a:rPr>
+              <a:t>BankAccount</a:t>
+            </a:r>
+            <a:r>
+              <a:rPr lang="en-US" sz="1300" b="1" dirty="0" smtClean="0">
+                <a:latin typeface="Courier New" pitchFamily="49" charset="0"/>
+                <a:cs typeface="Courier New" pitchFamily="49" charset="0"/>
+              </a:rPr>
               <a:t> </a:t>
             </a:r>
             <a:r>
+              <a:rPr lang="en-US" sz="1300" b="1" dirty="0" err="1" smtClean="0">
+                <a:latin typeface="Courier New" pitchFamily="49" charset="0"/>
+                <a:cs typeface="Courier New" pitchFamily="49" charset="0"/>
+              </a:rPr>
+              <a:t>bankAccount</a:t>
+            </a:r>
+            <a:r>
               <a:rPr lang="en-US" sz="1300" b="1" dirty="0" smtClean="0">
                 <a:latin typeface="Courier New" pitchFamily="49" charset="0"/>
                 <a:cs typeface="Courier New" pitchFamily="49" charset="0"/>
               </a:rPr>
-              <a:t>   </a:t>
-            </a:r>
+              <a:t>)</a:t>
+            </a:r>
+          </a:p>
+          <a:p>
+            <a:pPr>
+              <a:buNone/>
+            </a:pPr>
             <a:r>
               <a:rPr lang="en-US" sz="1300" b="1" dirty="0" smtClean="0">
                 <a:latin typeface="Courier New" pitchFamily="49" charset="0"/>
                 <a:cs typeface="Courier New" pitchFamily="49" charset="0"/>
               </a:rPr>
-              <a:t>public void </a:t>
+              <a:t>    {</a:t>
+            </a:r>
+          </a:p>
+          <a:p>
+            <a:pPr>
+              <a:buNone/>
+            </a:pPr>
+            <a:r>
+              <a:rPr lang="en-US" sz="1300" b="1" dirty="0" smtClean="0">
+                <a:latin typeface="Courier New" pitchFamily="49" charset="0"/>
+                <a:cs typeface="Courier New" pitchFamily="49" charset="0"/>
+              </a:rPr>
+              <a:t>        if (</a:t>
             </a:r>
             <a:r>
               <a:rPr lang="en-US" sz="1300" b="1" dirty="0" err="1" smtClean="0">
                 <a:latin typeface="Courier New" pitchFamily="49" charset="0"/>
                 <a:cs typeface="Courier New" pitchFamily="49" charset="0"/>
               </a:rPr>
-              <a:t>DoSomething</a:t>
+              <a:t>bankAccount.PrimaryAccountHolder.State</a:t>
             </a:r>
             <a:r>
               <a:rPr lang="en-US" sz="1300" b="1" dirty="0" smtClean="0">
                 <a:latin typeface="Courier New" pitchFamily="49" charset="0"/>
                 <a:cs typeface="Courier New" pitchFamily="49" charset="0"/>
               </a:rPr>
+              <a:t> == “OH”)</a:t>
+            </a:r>
+          </a:p>
+          <a:p>
+            <a:pPr>
+              <a:buNone/>
+            </a:pPr>
+            <a:r>
+              <a:rPr lang="en-US" sz="1300" b="1" dirty="0" smtClean="0">
+                <a:latin typeface="Courier New" pitchFamily="49" charset="0"/>
+                <a:cs typeface="Courier New" pitchFamily="49" charset="0"/>
+              </a:rPr>
+              <a:t>        {</a:t>
+            </a:r>
+          </a:p>
+          <a:p>
+            <a:pPr>
+              <a:buNone/>
+            </a:pPr>
+            <a:r>
+              <a:rPr lang="en-US" sz="1300" b="1" dirty="0" smtClean="0">
+                <a:latin typeface="Courier New" pitchFamily="49" charset="0"/>
+                <a:cs typeface="Courier New" pitchFamily="49" charset="0"/>
+              </a:rPr>
+              <a:t>            </a:t>
+            </a:r>
+            <a:r>
+              <a:rPr lang="en-US" sz="1300" b="1" dirty="0" err="1" smtClean="0">
+                <a:latin typeface="Courier New" pitchFamily="49" charset="0"/>
+                <a:cs typeface="Courier New" pitchFamily="49" charset="0"/>
+              </a:rPr>
+              <a:t>DoSomethingElse</a:t>
+            </a:r>
+            <a:r>
+              <a:rPr lang="en-US" sz="1300" b="1" dirty="0" smtClean="0">
+                <a:latin typeface="Courier New" pitchFamily="49" charset="0"/>
+                <a:cs typeface="Courier New" pitchFamily="49" charset="0"/>
+              </a:rPr>
               <a:t>(</a:t>
             </a:r>
             <a:r>
@@ -21579,33 +22345,27 @@
                 <a:latin typeface="Courier New" pitchFamily="49" charset="0"/>
                 <a:cs typeface="Courier New" pitchFamily="49" charset="0"/>
               </a:rPr>
-              <a:t>BankAccount</a:t>
+              <a:t>bankAccount</a:t>
             </a:r>
             <a:r>
               <a:rPr lang="en-US" sz="1300" b="1" dirty="0" smtClean="0">
                 <a:latin typeface="Courier New" pitchFamily="49" charset="0"/>
                 <a:cs typeface="Courier New" pitchFamily="49" charset="0"/>
               </a:rPr>
-              <a:t> </a:t>
-            </a:r>
-            <a:r>
-              <a:rPr lang="en-US" sz="1300" b="1" dirty="0" err="1" smtClean="0">
-                <a:latin typeface="Courier New" pitchFamily="49" charset="0"/>
-                <a:cs typeface="Courier New" pitchFamily="49" charset="0"/>
-              </a:rPr>
-              <a:t>bankAccount</a:t>
-            </a:r>
+              <a:t>);</a:t>
+            </a:r>
+          </a:p>
+          <a:p>
+            <a:pPr>
+              <a:buNone/>
+            </a:pPr>
             <a:r>
               <a:rPr lang="en-US" sz="1300" b="1" dirty="0" smtClean="0">
                 <a:latin typeface="Courier New" pitchFamily="49" charset="0"/>
                 <a:cs typeface="Courier New" pitchFamily="49" charset="0"/>
               </a:rPr>
-              <a:t>)</a:t>
-            </a:r>
-            <a:endParaRPr lang="en-US" sz="1300" b="1" dirty="0" smtClean="0">
-              <a:latin typeface="Courier New" pitchFamily="49" charset="0"/>
-              <a:cs typeface="Courier New" pitchFamily="49" charset="0"/>
-            </a:endParaRPr>
+              <a:t>        }</a:t>
+            </a:r>
           </a:p>
           <a:p>
             <a:pPr>
@@ -21616,12 +22376,8 @@
                 <a:latin typeface="Courier New" pitchFamily="49" charset="0"/>
                 <a:cs typeface="Courier New" pitchFamily="49" charset="0"/>
               </a:rPr>
-              <a:t>    {</a:t>
-            </a:r>
-            <a:endParaRPr lang="en-US" sz="1300" b="1" dirty="0" smtClean="0">
-              <a:latin typeface="Courier New" pitchFamily="49" charset="0"/>
-              <a:cs typeface="Courier New" pitchFamily="49" charset="0"/>
-            </a:endParaRPr>
+              <a:t>    }</a:t>
+            </a:r>
           </a:p>
           <a:p>
             <a:pPr>
@@ -21632,158 +22388,8 @@
                 <a:latin typeface="Courier New" pitchFamily="49" charset="0"/>
                 <a:cs typeface="Courier New" pitchFamily="49" charset="0"/>
               </a:rPr>
-              <a:t>        if </a:t>
-            </a:r>
-            <a:r>
-              <a:rPr lang="en-US" sz="1300" b="1" dirty="0" smtClean="0">
-                <a:latin typeface="Courier New" pitchFamily="49" charset="0"/>
-                <a:cs typeface="Courier New" pitchFamily="49" charset="0"/>
-              </a:rPr>
-              <a:t>(</a:t>
-            </a:r>
-            <a:r>
-              <a:rPr lang="en-US" sz="1300" b="1" dirty="0" err="1" smtClean="0">
-                <a:latin typeface="Courier New" pitchFamily="49" charset="0"/>
-                <a:cs typeface="Courier New" pitchFamily="49" charset="0"/>
-              </a:rPr>
-              <a:t>bankAccount.PrimaryAccountHolder.State</a:t>
-            </a:r>
-            <a:r>
-              <a:rPr lang="en-US" sz="1300" b="1" dirty="0" smtClean="0">
-                <a:latin typeface="Courier New" pitchFamily="49" charset="0"/>
-                <a:cs typeface="Courier New" pitchFamily="49" charset="0"/>
-              </a:rPr>
-              <a:t> == “OH”)</a:t>
-            </a:r>
-            <a:endParaRPr lang="en-US" sz="1300" b="1" dirty="0" smtClean="0">
-              <a:latin typeface="Courier New" pitchFamily="49" charset="0"/>
-              <a:cs typeface="Courier New" pitchFamily="49" charset="0"/>
-            </a:endParaRPr>
-          </a:p>
-          <a:p>
-            <a:pPr>
-              <a:buNone/>
-            </a:pPr>
-            <a:r>
-              <a:rPr lang="en-US" sz="1300" b="1" dirty="0" smtClean="0">
-                <a:latin typeface="Courier New" pitchFamily="49" charset="0"/>
-                <a:cs typeface="Courier New" pitchFamily="49" charset="0"/>
-              </a:rPr>
-              <a:t>    </a:t>
-            </a:r>
-            <a:r>
-              <a:rPr lang="en-US" sz="1300" b="1" dirty="0" smtClean="0">
-                <a:latin typeface="Courier New" pitchFamily="49" charset="0"/>
-                <a:cs typeface="Courier New" pitchFamily="49" charset="0"/>
-              </a:rPr>
-              <a:t>    {</a:t>
-            </a:r>
-            <a:endParaRPr lang="en-US" sz="1300" b="1" dirty="0" smtClean="0">
-              <a:latin typeface="Courier New" pitchFamily="49" charset="0"/>
-              <a:cs typeface="Courier New" pitchFamily="49" charset="0"/>
-            </a:endParaRPr>
-          </a:p>
-          <a:p>
-            <a:pPr>
-              <a:buNone/>
-            </a:pPr>
-            <a:r>
-              <a:rPr lang="en-US" sz="1300" b="1" dirty="0" smtClean="0">
-                <a:latin typeface="Courier New" pitchFamily="49" charset="0"/>
-                <a:cs typeface="Courier New" pitchFamily="49" charset="0"/>
-              </a:rPr>
-              <a:t>       </a:t>
-            </a:r>
-            <a:r>
-              <a:rPr lang="en-US" sz="1300" b="1" dirty="0" smtClean="0">
-                <a:latin typeface="Courier New" pitchFamily="49" charset="0"/>
-                <a:cs typeface="Courier New" pitchFamily="49" charset="0"/>
-              </a:rPr>
-              <a:t>     </a:t>
-            </a:r>
-            <a:r>
-              <a:rPr lang="en-US" sz="1300" b="1" dirty="0" err="1" smtClean="0">
-                <a:latin typeface="Courier New" pitchFamily="49" charset="0"/>
-                <a:cs typeface="Courier New" pitchFamily="49" charset="0"/>
-              </a:rPr>
-              <a:t>DoSomethingElse</a:t>
-            </a:r>
-            <a:r>
-              <a:rPr lang="en-US" sz="1300" b="1" dirty="0" smtClean="0">
-                <a:latin typeface="Courier New" pitchFamily="49" charset="0"/>
-                <a:cs typeface="Courier New" pitchFamily="49" charset="0"/>
-              </a:rPr>
-              <a:t>(</a:t>
-            </a:r>
-            <a:r>
-              <a:rPr lang="en-US" sz="1300" b="1" dirty="0" err="1" smtClean="0">
-                <a:latin typeface="Courier New" pitchFamily="49" charset="0"/>
-                <a:cs typeface="Courier New" pitchFamily="49" charset="0"/>
-              </a:rPr>
-              <a:t>bankAccount</a:t>
-            </a:r>
-            <a:r>
-              <a:rPr lang="en-US" sz="1300" b="1" dirty="0" smtClean="0">
-                <a:latin typeface="Courier New" pitchFamily="49" charset="0"/>
-                <a:cs typeface="Courier New" pitchFamily="49" charset="0"/>
-              </a:rPr>
-              <a:t>);</a:t>
-            </a:r>
-            <a:endParaRPr lang="en-US" sz="1300" b="1" dirty="0" smtClean="0">
-              <a:latin typeface="Courier New" pitchFamily="49" charset="0"/>
-              <a:cs typeface="Courier New" pitchFamily="49" charset="0"/>
-            </a:endParaRPr>
-          </a:p>
-          <a:p>
-            <a:pPr>
-              <a:buNone/>
-            </a:pPr>
-            <a:r>
-              <a:rPr lang="en-US" sz="1300" b="1" dirty="0" smtClean="0">
-                <a:latin typeface="Courier New" pitchFamily="49" charset="0"/>
-                <a:cs typeface="Courier New" pitchFamily="49" charset="0"/>
-              </a:rPr>
-              <a:t>    </a:t>
-            </a:r>
-            <a:r>
-              <a:rPr lang="en-US" sz="1300" b="1" dirty="0" smtClean="0">
-                <a:latin typeface="Courier New" pitchFamily="49" charset="0"/>
-                <a:cs typeface="Courier New" pitchFamily="49" charset="0"/>
-              </a:rPr>
-              <a:t>    }</a:t>
-            </a:r>
-            <a:endParaRPr lang="en-US" sz="1300" b="1" dirty="0" smtClean="0">
-              <a:latin typeface="Courier New" pitchFamily="49" charset="0"/>
-              <a:cs typeface="Courier New" pitchFamily="49" charset="0"/>
-            </a:endParaRPr>
-          </a:p>
-          <a:p>
-            <a:pPr>
-              <a:buNone/>
-            </a:pPr>
-            <a:r>
-              <a:rPr lang="en-US" sz="1300" b="1" dirty="0" smtClean="0">
-                <a:latin typeface="Courier New" pitchFamily="49" charset="0"/>
-                <a:cs typeface="Courier New" pitchFamily="49" charset="0"/>
-              </a:rPr>
-              <a:t>    }</a:t>
-            </a:r>
-          </a:p>
-          <a:p>
-            <a:pPr>
-              <a:buNone/>
-            </a:pPr>
-            <a:r>
-              <a:rPr lang="en-US" sz="1300" b="1" dirty="0" smtClean="0">
-                <a:latin typeface="Courier New" pitchFamily="49" charset="0"/>
-                <a:cs typeface="Courier New" pitchFamily="49" charset="0"/>
-              </a:rPr>
               <a:t>}</a:t>
             </a:r>
-            <a:endParaRPr lang="en-US" sz="1300" b="1" dirty="0" smtClean="0">
-              <a:latin typeface="Courier New" pitchFamily="49" charset="0"/>
-              <a:cs typeface="Courier New" pitchFamily="49" charset="0"/>
-            </a:endParaRPr>
           </a:p>
           <a:p>
             <a:pPr>
@@ -21826,41 +22432,25 @@
           <a:p>
             <a:r>
               <a:rPr lang="en-US" sz="2800" dirty="0" smtClean="0"/>
-              <a:t>1) The </a:t>
-            </a:r>
+              <a:t>1) The object itself. </a:t>
+            </a:r>
+          </a:p>
+          <a:p>
             <a:r>
               <a:rPr lang="en-US" sz="2800" dirty="0" smtClean="0"/>
-              <a:t>object itself. </a:t>
+              <a:t>2) An argument of the method. </a:t>
             </a:r>
           </a:p>
           <a:p>
             <a:r>
               <a:rPr lang="en-US" sz="2800" dirty="0" smtClean="0"/>
-              <a:t>2) An </a:t>
-            </a:r>
+              <a:t>3) Any object created within the method. </a:t>
+            </a:r>
+          </a:p>
+          <a:p>
             <a:r>
               <a:rPr lang="en-US" sz="2800" dirty="0" smtClean="0"/>
-              <a:t>argument of the method. </a:t>
-            </a:r>
-          </a:p>
-          <a:p>
-            <a:r>
-              <a:rPr lang="en-US" sz="2800" dirty="0" smtClean="0"/>
-              <a:t>3) Any </a:t>
-            </a:r>
-            <a:r>
-              <a:rPr lang="en-US" sz="2800" dirty="0" smtClean="0"/>
-              <a:t>object created within the method. </a:t>
-            </a:r>
-          </a:p>
-          <a:p>
-            <a:r>
-              <a:rPr lang="en-US" sz="2800" dirty="0" smtClean="0"/>
-              <a:t>4) Any </a:t>
-            </a:r>
-            <a:r>
-              <a:rPr lang="en-US" sz="2800" dirty="0" smtClean="0"/>
-              <a:t>direct properties/fields of the object. </a:t>
+              <a:t>4) Any direct properties/fields of the object. </a:t>
             </a:r>
             <a:endParaRPr lang="en-US" sz="2800" dirty="0"/>
           </a:p>
@@ -22098,6 +22688,191 @@
               </a:rPr>
               <a:t>{</a:t>
             </a:r>
+          </a:p>
+          <a:p>
+            <a:pPr>
+              <a:buNone/>
+            </a:pPr>
+            <a:r>
+              <a:rPr lang="en-US" sz="1300" b="1" dirty="0" smtClean="0">
+                <a:latin typeface="Courier New" pitchFamily="49" charset="0"/>
+                <a:cs typeface="Courier New" pitchFamily="49" charset="0"/>
+              </a:rPr>
+              <a:t>    public void </a:t>
+            </a:r>
+            <a:r>
+              <a:rPr lang="en-US" sz="1300" b="1" dirty="0" err="1" smtClean="0">
+                <a:latin typeface="Courier New" pitchFamily="49" charset="0"/>
+                <a:cs typeface="Courier New" pitchFamily="49" charset="0"/>
+              </a:rPr>
+              <a:t>DoSomething</a:t>
+            </a:r>
+            <a:r>
+              <a:rPr lang="en-US" sz="1300" b="1" dirty="0" smtClean="0">
+                <a:latin typeface="Courier New" pitchFamily="49" charset="0"/>
+                <a:cs typeface="Courier New" pitchFamily="49" charset="0"/>
+              </a:rPr>
+              <a:t>(</a:t>
+            </a:r>
+            <a:r>
+              <a:rPr lang="en-US" sz="1300" b="1" dirty="0" err="1" smtClean="0">
+                <a:latin typeface="Courier New" pitchFamily="49" charset="0"/>
+                <a:cs typeface="Courier New" pitchFamily="49" charset="0"/>
+              </a:rPr>
+              <a:t>BankAccount</a:t>
+            </a:r>
+            <a:r>
+              <a:rPr lang="en-US" sz="1300" b="1" dirty="0" smtClean="0">
+                <a:latin typeface="Courier New" pitchFamily="49" charset="0"/>
+                <a:cs typeface="Courier New" pitchFamily="49" charset="0"/>
+              </a:rPr>
+              <a:t> </a:t>
+            </a:r>
+            <a:r>
+              <a:rPr lang="en-US" sz="1300" b="1" dirty="0" err="1" smtClean="0">
+                <a:latin typeface="Courier New" pitchFamily="49" charset="0"/>
+                <a:cs typeface="Courier New" pitchFamily="49" charset="0"/>
+              </a:rPr>
+              <a:t>bankAccount</a:t>
+            </a:r>
+            <a:r>
+              <a:rPr lang="en-US" sz="1300" b="1" dirty="0" smtClean="0">
+                <a:latin typeface="Courier New" pitchFamily="49" charset="0"/>
+                <a:cs typeface="Courier New" pitchFamily="49" charset="0"/>
+              </a:rPr>
+              <a:t>)</a:t>
+            </a:r>
+          </a:p>
+          <a:p>
+            <a:pPr>
+              <a:buNone/>
+            </a:pPr>
+            <a:r>
+              <a:rPr lang="en-US" sz="1300" b="1" dirty="0" smtClean="0">
+                <a:latin typeface="Courier New" pitchFamily="49" charset="0"/>
+                <a:cs typeface="Courier New" pitchFamily="49" charset="0"/>
+              </a:rPr>
+              <a:t>    {</a:t>
+            </a:r>
+          </a:p>
+          <a:p>
+            <a:pPr>
+              <a:buNone/>
+            </a:pPr>
+            <a:r>
+              <a:rPr lang="en-US" sz="1300" b="1" dirty="0" smtClean="0">
+                <a:latin typeface="Courier New" pitchFamily="49" charset="0"/>
+                <a:cs typeface="Courier New" pitchFamily="49" charset="0"/>
+              </a:rPr>
+              <a:t>        if (</a:t>
+            </a:r>
+            <a:r>
+              <a:rPr lang="en-US" sz="1300" b="1" dirty="0" err="1" smtClean="0">
+                <a:latin typeface="Courier New" pitchFamily="49" charset="0"/>
+                <a:cs typeface="Courier New" pitchFamily="49" charset="0"/>
+              </a:rPr>
+              <a:t>bankAccount.StateWhereAccountIsHeld</a:t>
+            </a:r>
+            <a:r>
+              <a:rPr lang="en-US" sz="1300" b="1" dirty="0" smtClean="0">
+                <a:latin typeface="Courier New" pitchFamily="49" charset="0"/>
+                <a:cs typeface="Courier New" pitchFamily="49" charset="0"/>
+              </a:rPr>
+              <a:t> == “OH”)</a:t>
+            </a:r>
+          </a:p>
+          <a:p>
+            <a:pPr>
+              <a:buNone/>
+            </a:pPr>
+            <a:r>
+              <a:rPr lang="en-US" sz="1300" b="1" dirty="0" smtClean="0">
+                <a:latin typeface="Courier New" pitchFamily="49" charset="0"/>
+                <a:cs typeface="Courier New" pitchFamily="49" charset="0"/>
+              </a:rPr>
+              <a:t>        {</a:t>
+            </a:r>
+          </a:p>
+          <a:p>
+            <a:pPr>
+              <a:buNone/>
+            </a:pPr>
+            <a:r>
+              <a:rPr lang="en-US" sz="1300" b="1" dirty="0" smtClean="0">
+                <a:latin typeface="Courier New" pitchFamily="49" charset="0"/>
+                <a:cs typeface="Courier New" pitchFamily="49" charset="0"/>
+              </a:rPr>
+              <a:t>            </a:t>
+            </a:r>
+            <a:r>
+              <a:rPr lang="en-US" sz="1300" b="1" dirty="0" err="1" smtClean="0">
+                <a:latin typeface="Courier New" pitchFamily="49" charset="0"/>
+                <a:cs typeface="Courier New" pitchFamily="49" charset="0"/>
+              </a:rPr>
+              <a:t>DoSomethingElse</a:t>
+            </a:r>
+            <a:r>
+              <a:rPr lang="en-US" sz="1300" b="1" dirty="0" smtClean="0">
+                <a:latin typeface="Courier New" pitchFamily="49" charset="0"/>
+                <a:cs typeface="Courier New" pitchFamily="49" charset="0"/>
+              </a:rPr>
+              <a:t>(</a:t>
+            </a:r>
+            <a:r>
+              <a:rPr lang="en-US" sz="1300" b="1" dirty="0" err="1" smtClean="0">
+                <a:latin typeface="Courier New" pitchFamily="49" charset="0"/>
+                <a:cs typeface="Courier New" pitchFamily="49" charset="0"/>
+              </a:rPr>
+              <a:t>bankAccount</a:t>
+            </a:r>
+            <a:r>
+              <a:rPr lang="en-US" sz="1300" b="1" dirty="0" smtClean="0">
+                <a:latin typeface="Courier New" pitchFamily="49" charset="0"/>
+                <a:cs typeface="Courier New" pitchFamily="49" charset="0"/>
+              </a:rPr>
+              <a:t>);</a:t>
+            </a:r>
+          </a:p>
+          <a:p>
+            <a:pPr>
+              <a:buNone/>
+            </a:pPr>
+            <a:r>
+              <a:rPr lang="en-US" sz="1300" b="1" dirty="0" smtClean="0">
+                <a:latin typeface="Courier New" pitchFamily="49" charset="0"/>
+                <a:cs typeface="Courier New" pitchFamily="49" charset="0"/>
+              </a:rPr>
+              <a:t>        }</a:t>
+            </a:r>
+          </a:p>
+          <a:p>
+            <a:pPr>
+              <a:buNone/>
+            </a:pPr>
+            <a:r>
+              <a:rPr lang="en-US" sz="1300" b="1" dirty="0" smtClean="0">
+                <a:latin typeface="Courier New" pitchFamily="49" charset="0"/>
+                <a:cs typeface="Courier New" pitchFamily="49" charset="0"/>
+              </a:rPr>
+              <a:t>    }</a:t>
+            </a:r>
+          </a:p>
+          <a:p>
+            <a:pPr>
+              <a:buNone/>
+            </a:pPr>
+            <a:r>
+              <a:rPr lang="en-US" sz="1300" b="1" dirty="0" smtClean="0">
+                <a:latin typeface="Courier New" pitchFamily="49" charset="0"/>
+                <a:cs typeface="Courier New" pitchFamily="49" charset="0"/>
+              </a:rPr>
+              <a:t>}</a:t>
+            </a:r>
+          </a:p>
+          <a:p>
+            <a:pPr>
+              <a:buNone/>
+            </a:pPr>
             <a:endParaRPr lang="en-US" sz="1300" b="1" dirty="0" smtClean="0">
               <a:latin typeface="Courier New" pitchFamily="49" charset="0"/>
               <a:cs typeface="Courier New" pitchFamily="49" charset="0"/>
@@ -22112,63 +22887,14 @@
                 <a:latin typeface="Courier New" pitchFamily="49" charset="0"/>
                 <a:cs typeface="Courier New" pitchFamily="49" charset="0"/>
               </a:rPr>
-              <a:t> </a:t>
-            </a:r>
-            <a:r>
-              <a:rPr lang="en-US" sz="1300" b="1" dirty="0" smtClean="0">
-                <a:latin typeface="Courier New" pitchFamily="49" charset="0"/>
-                <a:cs typeface="Courier New" pitchFamily="49" charset="0"/>
-              </a:rPr>
-              <a:t>   </a:t>
-            </a:r>
-            <a:r>
-              <a:rPr lang="en-US" sz="1300" b="1" dirty="0" smtClean="0">
-                <a:latin typeface="Courier New" pitchFamily="49" charset="0"/>
-                <a:cs typeface="Courier New" pitchFamily="49" charset="0"/>
-              </a:rPr>
-              <a:t>public void </a:t>
+              <a:t>public class </a:t>
             </a:r>
             <a:r>
               <a:rPr lang="en-US" sz="1300" b="1" dirty="0" err="1" smtClean="0">
                 <a:latin typeface="Courier New" pitchFamily="49" charset="0"/>
                 <a:cs typeface="Courier New" pitchFamily="49" charset="0"/>
               </a:rPr>
-              <a:t>DoSomething</a:t>
-            </a:r>
-            <a:r>
-              <a:rPr lang="en-US" sz="1300" b="1" dirty="0" smtClean="0">
-                <a:latin typeface="Courier New" pitchFamily="49" charset="0"/>
-                <a:cs typeface="Courier New" pitchFamily="49" charset="0"/>
-              </a:rPr>
-              <a:t>(</a:t>
-            </a:r>
-            <a:r>
-              <a:rPr lang="en-US" sz="1300" b="1" dirty="0" err="1" smtClean="0">
-                <a:latin typeface="Courier New" pitchFamily="49" charset="0"/>
-                <a:cs typeface="Courier New" pitchFamily="49" charset="0"/>
-              </a:rPr>
               <a:t>BankAccount</a:t>
-            </a:r>
-            <a:r>
-              <a:rPr lang="en-US" sz="1300" b="1" dirty="0" smtClean="0">
-                <a:latin typeface="Courier New" pitchFamily="49" charset="0"/>
-                <a:cs typeface="Courier New" pitchFamily="49" charset="0"/>
-              </a:rPr>
-              <a:t> </a:t>
-            </a:r>
-            <a:r>
-              <a:rPr lang="en-US" sz="1300" b="1" dirty="0" err="1" smtClean="0">
-                <a:latin typeface="Courier New" pitchFamily="49" charset="0"/>
-                <a:cs typeface="Courier New" pitchFamily="49" charset="0"/>
-              </a:rPr>
-              <a:t>bankAccount</a:t>
-            </a:r>
-            <a:r>
-              <a:rPr lang="en-US" sz="1300" b="1" dirty="0" smtClean="0">
-                <a:latin typeface="Courier New" pitchFamily="49" charset="0"/>
-                <a:cs typeface="Courier New" pitchFamily="49" charset="0"/>
-              </a:rPr>
-              <a:t>)</a:t>
             </a:r>
             <a:endParaRPr lang="en-US" sz="1300" b="1" dirty="0" smtClean="0">
               <a:latin typeface="Courier New" pitchFamily="49" charset="0"/>
@@ -22184,7 +22910,26 @@
                 <a:latin typeface="Courier New" pitchFamily="49" charset="0"/>
                 <a:cs typeface="Courier New" pitchFamily="49" charset="0"/>
               </a:rPr>
-              <a:t>    {</a:t>
+              <a:t>{</a:t>
+            </a:r>
+          </a:p>
+          <a:p>
+            <a:pPr>
+              <a:buNone/>
+            </a:pPr>
+            <a:r>
+              <a:rPr lang="en-US" sz="1300" b="1" dirty="0" smtClean="0">
+                <a:latin typeface="Courier New" pitchFamily="49" charset="0"/>
+                <a:cs typeface="Courier New" pitchFamily="49" charset="0"/>
+              </a:rPr>
+              <a:t>    public string </a:t>
+            </a:r>
+            <a:r>
+              <a:rPr lang="en-US" sz="1300" b="1" dirty="0" err="1" smtClean="0">
+                <a:latin typeface="Courier New" pitchFamily="49" charset="0"/>
+                <a:cs typeface="Courier New" pitchFamily="49" charset="0"/>
+              </a:rPr>
+              <a:t>StateWhereAccountIsHeld</a:t>
             </a:r>
             <a:endParaRPr lang="en-US" sz="1300" b="1" dirty="0" smtClean="0">
               <a:latin typeface="Courier New" pitchFamily="49" charset="0"/>
@@ -22200,33 +22945,34 @@
                 <a:latin typeface="Courier New" pitchFamily="49" charset="0"/>
                 <a:cs typeface="Courier New" pitchFamily="49" charset="0"/>
               </a:rPr>
-              <a:t>        if </a:t>
-            </a:r>
+              <a:t>    {</a:t>
+            </a:r>
+          </a:p>
+          <a:p>
+            <a:pPr>
+              <a:buNone/>
+            </a:pPr>
             <a:r>
               <a:rPr lang="en-US" sz="1300" b="1" dirty="0" smtClean="0">
                 <a:latin typeface="Courier New" pitchFamily="49" charset="0"/>
                 <a:cs typeface="Courier New" pitchFamily="49" charset="0"/>
               </a:rPr>
-              <a:t>(</a:t>
+              <a:t>        get { return </a:t>
             </a:r>
             <a:r>
               <a:rPr lang="en-US" sz="1300" b="1" dirty="0" err="1" smtClean="0">
                 <a:latin typeface="Courier New" pitchFamily="49" charset="0"/>
                 <a:cs typeface="Courier New" pitchFamily="49" charset="0"/>
               </a:rPr>
-              <a:t>bankAccount.StateWhereAccountIsHeld</a:t>
+              <a:t>PrimaryAccountHolder.State</a:t>
             </a:r>
             <a:r>
               <a:rPr lang="en-US" sz="1300" b="1" dirty="0" smtClean="0">
                 <a:latin typeface="Courier New" pitchFamily="49" charset="0"/>
                 <a:cs typeface="Courier New" pitchFamily="49" charset="0"/>
               </a:rPr>
-              <a:t> == “OH”)</a:t>
-            </a:r>
-            <a:endParaRPr lang="en-US" sz="1300" b="1" dirty="0" smtClean="0">
-              <a:latin typeface="Courier New" pitchFamily="49" charset="0"/>
-              <a:cs typeface="Courier New" pitchFamily="49" charset="0"/>
-            </a:endParaRPr>
+              <a:t>; }</a:t>
+            </a:r>
           </a:p>
           <a:p>
             <a:pPr>
@@ -22237,285 +22983,20 @@
                 <a:latin typeface="Courier New" pitchFamily="49" charset="0"/>
                 <a:cs typeface="Courier New" pitchFamily="49" charset="0"/>
               </a:rPr>
-              <a:t>    </a:t>
-            </a:r>
+              <a:t>    }</a:t>
+            </a:r>
+          </a:p>
+          <a:p>
+            <a:pPr>
+              <a:buNone/>
+            </a:pPr>
             <a:r>
               <a:rPr lang="en-US" sz="1300" b="1" dirty="0" smtClean="0">
                 <a:latin typeface="Courier New" pitchFamily="49" charset="0"/>
                 <a:cs typeface="Courier New" pitchFamily="49" charset="0"/>
               </a:rPr>
-              <a:t>    {</a:t>
-            </a:r>
-            <a:endParaRPr lang="en-US" sz="1300" b="1" dirty="0" smtClean="0">
-              <a:latin typeface="Courier New" pitchFamily="49" charset="0"/>
-              <a:cs typeface="Courier New" pitchFamily="49" charset="0"/>
-            </a:endParaRPr>
-          </a:p>
-          <a:p>
-            <a:pPr>
-              <a:buNone/>
-            </a:pPr>
-            <a:r>
-              <a:rPr lang="en-US" sz="1300" b="1" dirty="0" smtClean="0">
-                <a:latin typeface="Courier New" pitchFamily="49" charset="0"/>
-                <a:cs typeface="Courier New" pitchFamily="49" charset="0"/>
-              </a:rPr>
-              <a:t>       </a:t>
-            </a:r>
-            <a:r>
-              <a:rPr lang="en-US" sz="1300" b="1" dirty="0" smtClean="0">
-                <a:latin typeface="Courier New" pitchFamily="49" charset="0"/>
-                <a:cs typeface="Courier New" pitchFamily="49" charset="0"/>
-              </a:rPr>
-              <a:t>     </a:t>
-            </a:r>
-            <a:r>
-              <a:rPr lang="en-US" sz="1300" b="1" dirty="0" err="1" smtClean="0">
-                <a:latin typeface="Courier New" pitchFamily="49" charset="0"/>
-                <a:cs typeface="Courier New" pitchFamily="49" charset="0"/>
-              </a:rPr>
-              <a:t>DoSomethingElse</a:t>
-            </a:r>
-            <a:r>
-              <a:rPr lang="en-US" sz="1300" b="1" dirty="0" smtClean="0">
-                <a:latin typeface="Courier New" pitchFamily="49" charset="0"/>
-                <a:cs typeface="Courier New" pitchFamily="49" charset="0"/>
-              </a:rPr>
-              <a:t>(</a:t>
-            </a:r>
-            <a:r>
-              <a:rPr lang="en-US" sz="1300" b="1" dirty="0" err="1" smtClean="0">
-                <a:latin typeface="Courier New" pitchFamily="49" charset="0"/>
-                <a:cs typeface="Courier New" pitchFamily="49" charset="0"/>
-              </a:rPr>
-              <a:t>bankAccount</a:t>
-            </a:r>
-            <a:r>
-              <a:rPr lang="en-US" sz="1300" b="1" dirty="0" smtClean="0">
-                <a:latin typeface="Courier New" pitchFamily="49" charset="0"/>
-                <a:cs typeface="Courier New" pitchFamily="49" charset="0"/>
-              </a:rPr>
-              <a:t>);</a:t>
-            </a:r>
-            <a:endParaRPr lang="en-US" sz="1300" b="1" dirty="0" smtClean="0">
-              <a:latin typeface="Courier New" pitchFamily="49" charset="0"/>
-              <a:cs typeface="Courier New" pitchFamily="49" charset="0"/>
-            </a:endParaRPr>
-          </a:p>
-          <a:p>
-            <a:pPr>
-              <a:buNone/>
-            </a:pPr>
-            <a:r>
-              <a:rPr lang="en-US" sz="1300" b="1" dirty="0" smtClean="0">
-                <a:latin typeface="Courier New" pitchFamily="49" charset="0"/>
-                <a:cs typeface="Courier New" pitchFamily="49" charset="0"/>
-              </a:rPr>
-              <a:t>    </a:t>
-            </a:r>
-            <a:r>
-              <a:rPr lang="en-US" sz="1300" b="1" dirty="0" smtClean="0">
-                <a:latin typeface="Courier New" pitchFamily="49" charset="0"/>
-                <a:cs typeface="Courier New" pitchFamily="49" charset="0"/>
-              </a:rPr>
-              <a:t>    }</a:t>
-            </a:r>
-            <a:endParaRPr lang="en-US" sz="1300" b="1" dirty="0" smtClean="0">
-              <a:latin typeface="Courier New" pitchFamily="49" charset="0"/>
-              <a:cs typeface="Courier New" pitchFamily="49" charset="0"/>
-            </a:endParaRPr>
-          </a:p>
-          <a:p>
-            <a:pPr>
-              <a:buNone/>
-            </a:pPr>
-            <a:r>
-              <a:rPr lang="en-US" sz="1300" b="1" dirty="0" smtClean="0">
-                <a:latin typeface="Courier New" pitchFamily="49" charset="0"/>
-                <a:cs typeface="Courier New" pitchFamily="49" charset="0"/>
-              </a:rPr>
-              <a:t>    }</a:t>
-            </a:r>
-          </a:p>
-          <a:p>
-            <a:pPr>
-              <a:buNone/>
-            </a:pPr>
-            <a:r>
-              <a:rPr lang="en-US" sz="1300" b="1" dirty="0" smtClean="0">
-                <a:latin typeface="Courier New" pitchFamily="49" charset="0"/>
-                <a:cs typeface="Courier New" pitchFamily="49" charset="0"/>
-              </a:rPr>
               <a:t>}</a:t>
             </a:r>
-          </a:p>
-          <a:p>
-            <a:pPr>
-              <a:buNone/>
-            </a:pPr>
-            <a:endParaRPr lang="en-US" sz="1300" b="1" dirty="0" smtClean="0">
-              <a:latin typeface="Courier New" pitchFamily="49" charset="0"/>
-              <a:cs typeface="Courier New" pitchFamily="49" charset="0"/>
-            </a:endParaRPr>
-          </a:p>
-          <a:p>
-            <a:pPr>
-              <a:buNone/>
-            </a:pPr>
-            <a:r>
-              <a:rPr lang="en-US" sz="1300" b="1" dirty="0" smtClean="0">
-                <a:latin typeface="Courier New" pitchFamily="49" charset="0"/>
-                <a:cs typeface="Courier New" pitchFamily="49" charset="0"/>
-              </a:rPr>
-              <a:t>p</a:t>
-            </a:r>
-            <a:r>
-              <a:rPr lang="en-US" sz="1300" b="1" dirty="0" smtClean="0">
-                <a:latin typeface="Courier New" pitchFamily="49" charset="0"/>
-                <a:cs typeface="Courier New" pitchFamily="49" charset="0"/>
-              </a:rPr>
-              <a:t>ublic class </a:t>
-            </a:r>
-            <a:r>
-              <a:rPr lang="en-US" sz="1300" b="1" dirty="0" err="1" smtClean="0">
-                <a:latin typeface="Courier New" pitchFamily="49" charset="0"/>
-                <a:cs typeface="Courier New" pitchFamily="49" charset="0"/>
-              </a:rPr>
-              <a:t>BankAccount</a:t>
-            </a:r>
-            <a:endParaRPr lang="en-US" sz="1300" b="1" dirty="0" smtClean="0">
-              <a:latin typeface="Courier New" pitchFamily="49" charset="0"/>
-              <a:cs typeface="Courier New" pitchFamily="49" charset="0"/>
-            </a:endParaRPr>
-          </a:p>
-          <a:p>
-            <a:pPr>
-              <a:buNone/>
-            </a:pPr>
-            <a:r>
-              <a:rPr lang="en-US" sz="1300" b="1" dirty="0" smtClean="0">
-                <a:latin typeface="Courier New" pitchFamily="49" charset="0"/>
-                <a:cs typeface="Courier New" pitchFamily="49" charset="0"/>
-              </a:rPr>
-              <a:t>{</a:t>
-            </a:r>
-          </a:p>
-          <a:p>
-            <a:pPr>
-              <a:buNone/>
-            </a:pPr>
-            <a:r>
-              <a:rPr lang="en-US" sz="1300" b="1" dirty="0" smtClean="0">
-                <a:latin typeface="Courier New" pitchFamily="49" charset="0"/>
-                <a:cs typeface="Courier New" pitchFamily="49" charset="0"/>
-              </a:rPr>
-              <a:t> </a:t>
-            </a:r>
-            <a:r>
-              <a:rPr lang="en-US" sz="1300" b="1" dirty="0" smtClean="0">
-                <a:latin typeface="Courier New" pitchFamily="49" charset="0"/>
-                <a:cs typeface="Courier New" pitchFamily="49" charset="0"/>
-              </a:rPr>
-              <a:t>   public string </a:t>
-            </a:r>
-            <a:r>
-              <a:rPr lang="en-US" sz="1300" b="1" dirty="0" err="1" smtClean="0">
-                <a:latin typeface="Courier New" pitchFamily="49" charset="0"/>
-                <a:cs typeface="Courier New" pitchFamily="49" charset="0"/>
-              </a:rPr>
-              <a:t>StateWhereAccountIsHeld</a:t>
-            </a:r>
-            <a:endParaRPr lang="en-US" sz="1300" b="1" dirty="0" smtClean="0">
-              <a:latin typeface="Courier New" pitchFamily="49" charset="0"/>
-              <a:cs typeface="Courier New" pitchFamily="49" charset="0"/>
-            </a:endParaRPr>
-          </a:p>
-          <a:p>
-            <a:pPr>
-              <a:buNone/>
-            </a:pPr>
-            <a:r>
-              <a:rPr lang="en-US" sz="1300" b="1" dirty="0" smtClean="0">
-                <a:latin typeface="Courier New" pitchFamily="49" charset="0"/>
-                <a:cs typeface="Courier New" pitchFamily="49" charset="0"/>
-              </a:rPr>
-              <a:t> </a:t>
-            </a:r>
-            <a:r>
-              <a:rPr lang="en-US" sz="1300" b="1" dirty="0" smtClean="0">
-                <a:latin typeface="Courier New" pitchFamily="49" charset="0"/>
-                <a:cs typeface="Courier New" pitchFamily="49" charset="0"/>
-              </a:rPr>
-              <a:t>   {</a:t>
-            </a:r>
-          </a:p>
-          <a:p>
-            <a:pPr>
-              <a:buNone/>
-            </a:pPr>
-            <a:r>
-              <a:rPr lang="en-US" sz="1300" b="1" dirty="0" smtClean="0">
-                <a:latin typeface="Courier New" pitchFamily="49" charset="0"/>
-                <a:cs typeface="Courier New" pitchFamily="49" charset="0"/>
-              </a:rPr>
-              <a:t> </a:t>
-            </a:r>
-            <a:r>
-              <a:rPr lang="en-US" sz="1300" b="1" dirty="0" smtClean="0">
-                <a:latin typeface="Courier New" pitchFamily="49" charset="0"/>
-                <a:cs typeface="Courier New" pitchFamily="49" charset="0"/>
-              </a:rPr>
-              <a:t>       get { return </a:t>
-            </a:r>
-            <a:r>
-              <a:rPr lang="en-US" sz="1300" b="1" dirty="0" err="1" smtClean="0">
-                <a:latin typeface="Courier New" pitchFamily="49" charset="0"/>
-                <a:cs typeface="Courier New" pitchFamily="49" charset="0"/>
-              </a:rPr>
-              <a:t>PrimaryAccountHolder.State</a:t>
-            </a:r>
-            <a:r>
-              <a:rPr lang="en-US" sz="1300" b="1" dirty="0" smtClean="0">
-                <a:latin typeface="Courier New" pitchFamily="49" charset="0"/>
-                <a:cs typeface="Courier New" pitchFamily="49" charset="0"/>
-              </a:rPr>
-              <a:t>; }</a:t>
-            </a:r>
-          </a:p>
-          <a:p>
-            <a:pPr>
-              <a:buNone/>
-            </a:pPr>
-            <a:r>
-              <a:rPr lang="en-US" sz="1300" b="1" dirty="0" smtClean="0">
-                <a:latin typeface="Courier New" pitchFamily="49" charset="0"/>
-                <a:cs typeface="Courier New" pitchFamily="49" charset="0"/>
-              </a:rPr>
-              <a:t> </a:t>
-            </a:r>
-            <a:r>
-              <a:rPr lang="en-US" sz="1300" b="1" dirty="0" smtClean="0">
-                <a:latin typeface="Courier New" pitchFamily="49" charset="0"/>
-                <a:cs typeface="Courier New" pitchFamily="49" charset="0"/>
-              </a:rPr>
-              <a:t>   }</a:t>
-            </a:r>
-          </a:p>
-          <a:p>
-            <a:pPr>
-              <a:buNone/>
-            </a:pPr>
-            <a:r>
-              <a:rPr lang="en-US" sz="1300" b="1" dirty="0" smtClean="0">
-                <a:latin typeface="Courier New" pitchFamily="49" charset="0"/>
-                <a:cs typeface="Courier New" pitchFamily="49" charset="0"/>
-              </a:rPr>
-              <a:t>}</a:t>
-            </a:r>
-            <a:endParaRPr lang="en-US" sz="1300" b="1" dirty="0" smtClean="0">
-              <a:latin typeface="Courier New" pitchFamily="49" charset="0"/>
-              <a:cs typeface="Courier New" pitchFamily="49" charset="0"/>
-            </a:endParaRPr>
           </a:p>
           <a:p>
             <a:pPr>
@@ -24275,15 +24756,7 @@
           <a:p>
             <a:r>
               <a:rPr lang="en-US" b="1" i="1" dirty="0" smtClean="0"/>
-              <a:t>Change!   </a:t>
-            </a:r>
-            <a:r>
-              <a:rPr lang="en-US" b="1" i="1" dirty="0" smtClean="0"/>
-              <a:t>We </a:t>
-            </a:r>
-            <a:r>
-              <a:rPr lang="en-US" b="1" i="1" dirty="0" smtClean="0"/>
-              <a:t>want to format the name for </a:t>
+              <a:t>Change!   We want to format the name for </a:t>
             </a:r>
             <a:r>
               <a:rPr lang="en-US" b="1" i="1" dirty="0" err="1" smtClean="0"/>
@@ -24291,11 +24764,7 @@
             </a:r>
             <a:r>
               <a:rPr lang="en-US" b="1" i="1" dirty="0" smtClean="0"/>
-              <a:t> objects as “First Name Last Name</a:t>
-            </a:r>
-            <a:r>
-              <a:rPr lang="en-US" b="1" i="1" dirty="0" smtClean="0"/>
-              <a:t>” instead of “Last Name, First Name”.</a:t>
+              <a:t> objects as “First Name Last Name” instead of “Last Name, First Name”.</a:t>
             </a:r>
             <a:endParaRPr lang="en-US" b="1" i="1" dirty="0"/>
           </a:p>
@@ -24395,13 +24864,8 @@
             </a:r>
             <a:r>
               <a:rPr lang="en-US" b="1" dirty="0" smtClean="0"/>
-              <a:t> formatter</a:t>
-            </a:r>
-            <a:r>
-              <a:rPr lang="en-US" b="1" dirty="0" smtClean="0"/>
-              <a:t>)</a:t>
-            </a:r>
-            <a:endParaRPr lang="en-US" b="1" dirty="0" smtClean="0"/>
+              <a:t> formatter)</a:t>
+            </a:r>
           </a:p>
         </p:txBody>
       </p:sp>
@@ -27716,21 +28180,7 @@
                 <a:latin typeface="Courier New" pitchFamily="49" charset="0"/>
                 <a:cs typeface="Courier New" pitchFamily="49" charset="0"/>
               </a:rPr>
-              <a:t>    // Return </a:t>
-            </a:r>
-            <a:r>
-              <a:rPr lang="en-US" sz="1500" b="1" dirty="0" smtClean="0">
-                <a:latin typeface="Courier New" pitchFamily="49" charset="0"/>
-                <a:cs typeface="Courier New" pitchFamily="49" charset="0"/>
-              </a:rPr>
-              <a:t>number </a:t>
-            </a:r>
-            <a:r>
-              <a:rPr lang="en-US" sz="1500" b="1" dirty="0" smtClean="0">
-                <a:latin typeface="Courier New" pitchFamily="49" charset="0"/>
-                <a:cs typeface="Courier New" pitchFamily="49" charset="0"/>
-              </a:rPr>
-              <a:t>of pieces of peel that</a:t>
+              <a:t>    // Return number of pieces of peel that</a:t>
             </a:r>
           </a:p>
           <a:p>
@@ -28141,21 +28591,7 @@
                 <a:latin typeface="Courier New" pitchFamily="49" charset="0"/>
                 <a:cs typeface="Courier New" pitchFamily="49" charset="0"/>
               </a:rPr>
-              <a:t>    // Return </a:t>
-            </a:r>
-            <a:r>
-              <a:rPr lang="en-US" sz="1500" b="1" dirty="0" smtClean="0">
-                <a:latin typeface="Courier New" pitchFamily="49" charset="0"/>
-                <a:cs typeface="Courier New" pitchFamily="49" charset="0"/>
-              </a:rPr>
-              <a:t>number </a:t>
-            </a:r>
-            <a:r>
-              <a:rPr lang="en-US" sz="1500" b="1" dirty="0" smtClean="0">
-                <a:latin typeface="Courier New" pitchFamily="49" charset="0"/>
-                <a:cs typeface="Courier New" pitchFamily="49" charset="0"/>
-              </a:rPr>
-              <a:t>of pieces of peel that</a:t>
+              <a:t>    // Return number of pieces of peel that</a:t>
             </a:r>
           </a:p>
           <a:p>
@@ -28639,21 +29075,7 @@
                 <a:latin typeface="Courier New" pitchFamily="49" charset="0"/>
                 <a:cs typeface="Courier New" pitchFamily="49" charset="0"/>
               </a:rPr>
-              <a:t>    // Return </a:t>
-            </a:r>
-            <a:r>
-              <a:rPr lang="en-US" sz="1200" b="1" dirty="0" smtClean="0">
-                <a:latin typeface="Courier New" pitchFamily="49" charset="0"/>
-                <a:cs typeface="Courier New" pitchFamily="49" charset="0"/>
-              </a:rPr>
-              <a:t>number </a:t>
-            </a:r>
-            <a:r>
-              <a:rPr lang="en-US" sz="1200" b="1" dirty="0" smtClean="0">
-                <a:latin typeface="Courier New" pitchFamily="49" charset="0"/>
-                <a:cs typeface="Courier New" pitchFamily="49" charset="0"/>
-              </a:rPr>
-              <a:t>of pieces of peel that</a:t>
+              <a:t>    // Return number of pieces of peel that</a:t>
             </a:r>
           </a:p>
           <a:p>
@@ -29175,21 +29597,7 @@
                 <a:latin typeface="Courier New" pitchFamily="49" charset="0"/>
                 <a:cs typeface="Courier New" pitchFamily="49" charset="0"/>
               </a:rPr>
-              <a:t>    // Return </a:t>
-            </a:r>
-            <a:r>
-              <a:rPr lang="en-US" sz="1200" b="1" dirty="0" smtClean="0">
-                <a:latin typeface="Courier New" pitchFamily="49" charset="0"/>
-                <a:cs typeface="Courier New" pitchFamily="49" charset="0"/>
-              </a:rPr>
-              <a:t>number </a:t>
-            </a:r>
-            <a:r>
-              <a:rPr lang="en-US" sz="1200" b="1" dirty="0" smtClean="0">
-                <a:latin typeface="Courier New" pitchFamily="49" charset="0"/>
-                <a:cs typeface="Courier New" pitchFamily="49" charset="0"/>
-              </a:rPr>
-              <a:t>of pieces of peel that</a:t>
+              <a:t>    // Return number of pieces of peel that</a:t>
             </a:r>
           </a:p>
           <a:p>
@@ -35632,15 +36040,7 @@
           <a:p>
             <a:r>
               <a:rPr lang="en-US" dirty="0" smtClean="0"/>
-              <a:t>Example: </a:t>
-            </a:r>
-            <a:r>
-              <a:rPr lang="en-US" dirty="0" smtClean="0"/>
-              <a:t>MVC </a:t>
-            </a:r>
-            <a:r>
-              <a:rPr lang="en-US" dirty="0" smtClean="0"/>
-              <a:t>controller classes, web services</a:t>
+              <a:t>Example: MVC controller classes, web services</a:t>
             </a:r>
           </a:p>
           <a:p>

</xml_diff>